<commit_message>
Add Final Review PPT
</commit_message>
<xml_diff>
--- a/Documents/Review 1.pptx
+++ b/Documents/Review 1.pptx
@@ -207,7 +207,7 @@
           <a:p>
             <a:fld id="{8A6903C3-51DE-4C61-A717-4B2796B9B9A0}" type="datetimeFigureOut">
               <a:rPr lang="en-IN" smtClean="0"/>
-              <a:t>17-10-2024</a:t>
+              <a:t>07-01-2025</a:t>
             </a:fld>
             <a:endParaRPr lang="en-IN"/>
           </a:p>
@@ -885,7 +885,7 @@
           <a:p>
             <a:fld id="{4994CE30-7D40-4BC0-BA0D-56C992D5B4BD}" type="datetimeFigureOut">
               <a:rPr lang="en-GB" smtClean="0"/>
-              <a:t>17/10/2024</a:t>
+              <a:t>07/01/2025</a:t>
             </a:fld>
             <a:endParaRPr lang="en-GB"/>
           </a:p>
@@ -1053,7 +1053,7 @@
           <a:p>
             <a:fld id="{4994CE30-7D40-4BC0-BA0D-56C992D5B4BD}" type="datetimeFigureOut">
               <a:rPr lang="en-GB" smtClean="0"/>
-              <a:t>17/10/2024</a:t>
+              <a:t>07/01/2025</a:t>
             </a:fld>
             <a:endParaRPr lang="en-GB"/>
           </a:p>
@@ -1231,7 +1231,7 @@
           <a:p>
             <a:fld id="{4994CE30-7D40-4BC0-BA0D-56C992D5B4BD}" type="datetimeFigureOut">
               <a:rPr lang="en-GB" smtClean="0"/>
-              <a:t>17/10/2024</a:t>
+              <a:t>07/01/2025</a:t>
             </a:fld>
             <a:endParaRPr lang="en-GB"/>
           </a:p>
@@ -1446,7 +1446,7 @@
           <a:p>
             <a:fld id="{4994CE30-7D40-4BC0-BA0D-56C992D5B4BD}" type="datetimeFigureOut">
               <a:rPr lang="en-GB" smtClean="0"/>
-              <a:t>17/10/2024</a:t>
+              <a:t>07/01/2025</a:t>
             </a:fld>
             <a:endParaRPr lang="en-GB"/>
           </a:p>
@@ -1691,7 +1691,7 @@
           <a:p>
             <a:fld id="{4994CE30-7D40-4BC0-BA0D-56C992D5B4BD}" type="datetimeFigureOut">
               <a:rPr lang="en-GB" smtClean="0"/>
-              <a:t>17/10/2024</a:t>
+              <a:t>07/01/2025</a:t>
             </a:fld>
             <a:endParaRPr lang="en-GB"/>
           </a:p>
@@ -1985,7 +1985,7 @@
           <a:p>
             <a:fld id="{4994CE30-7D40-4BC0-BA0D-56C992D5B4BD}" type="datetimeFigureOut">
               <a:rPr lang="en-GB" smtClean="0"/>
-              <a:t>17/10/2024</a:t>
+              <a:t>07/01/2025</a:t>
             </a:fld>
             <a:endParaRPr lang="en-GB"/>
           </a:p>
@@ -2413,7 +2413,7 @@
           <a:p>
             <a:fld id="{4994CE30-7D40-4BC0-BA0D-56C992D5B4BD}" type="datetimeFigureOut">
               <a:rPr lang="en-GB" smtClean="0"/>
-              <a:t>17/10/2024</a:t>
+              <a:t>07/01/2025</a:t>
             </a:fld>
             <a:endParaRPr lang="en-GB"/>
           </a:p>
@@ -2535,7 +2535,7 @@
           <a:p>
             <a:fld id="{4994CE30-7D40-4BC0-BA0D-56C992D5B4BD}" type="datetimeFigureOut">
               <a:rPr lang="en-GB" smtClean="0"/>
-              <a:t>17/10/2024</a:t>
+              <a:t>07/01/2025</a:t>
             </a:fld>
             <a:endParaRPr lang="en-GB"/>
           </a:p>
@@ -2671,7 +2671,7 @@
           <a:p>
             <a:fld id="{4994CE30-7D40-4BC0-BA0D-56C992D5B4BD}" type="datetimeFigureOut">
               <a:rPr lang="en-GB" smtClean="0"/>
-              <a:t>17/10/2024</a:t>
+              <a:t>07/01/2025</a:t>
             </a:fld>
             <a:endParaRPr lang="en-GB"/>
           </a:p>
@@ -2946,7 +2946,7 @@
           <a:p>
             <a:fld id="{4994CE30-7D40-4BC0-BA0D-56C992D5B4BD}" type="datetimeFigureOut">
               <a:rPr lang="en-GB" smtClean="0"/>
-              <a:t>17/10/2024</a:t>
+              <a:t>07/01/2025</a:t>
             </a:fld>
             <a:endParaRPr lang="en-GB"/>
           </a:p>
@@ -3202,7 +3202,7 @@
           <a:p>
             <a:fld id="{4994CE30-7D40-4BC0-BA0D-56C992D5B4BD}" type="datetimeFigureOut">
               <a:rPr lang="en-GB" smtClean="0"/>
-              <a:t>17/10/2024</a:t>
+              <a:t>07/01/2025</a:t>
             </a:fld>
             <a:endParaRPr lang="en-GB"/>
           </a:p>
@@ -3418,7 +3418,7 @@
           <a:p>
             <a:fld id="{4994CE30-7D40-4BC0-BA0D-56C992D5B4BD}" type="datetimeFigureOut">
               <a:rPr lang="en-GB" smtClean="0"/>
-              <a:t>17/10/2024</a:t>
+              <a:t>07/01/2025</a:t>
             </a:fld>
             <a:endParaRPr lang="en-GB"/>
           </a:p>
@@ -5271,7 +5271,7 @@
                 <a:cs typeface="Verdana"/>
                 <a:sym typeface="Verdana"/>
               </a:rPr>
-              <a:t>Review-1</a:t>
+              <a:t>Review-4</a:t>
             </a:r>
             <a:endParaRPr sz="2000" b="1" i="0" u="none" strike="noStrike" cap="none" dirty="0">
               <a:solidFill>

</xml_diff>